<commit_message>
notes about problems with poincare disc
</commit_message>
<xml_diff>
--- a/hplanes.pptx
+++ b/hplanes.pptx
@@ -552,6 +552,99 @@
             <a:fld id="{64A8B611-7969-4ED8-BAA6-733A94B518BB}" type="slidenum">
               <a:rPr lang="en-US" smtClean="0"/>
               <a:t>2</a:t>
+            </a:fld>
+            <a:endParaRPr lang="en-US"/>
+          </a:p>
+        </p:txBody>
+      </p:sp>
+    </p:spTree>
+  </p:cSld>
+  <p:clrMapOvr>
+    <a:masterClrMapping/>
+  </p:clrMapOvr>
+</p:notes>
+</file>
+
+<file path=ppt/notesSlides/notesSlide2.xml><?xml version="1.0" encoding="utf-8"?>
+<p:notes xmlns:a="http://schemas.openxmlformats.org/drawingml/2006/main" xmlns:r="http://schemas.openxmlformats.org/officeDocument/2006/relationships" xmlns:p="http://schemas.openxmlformats.org/presentationml/2006/main">
+  <p:cSld>
+    <p:spTree>
+      <p:nvGrpSpPr>
+        <p:cNvPr id="1" name=""/>
+        <p:cNvGrpSpPr/>
+        <p:nvPr/>
+      </p:nvGrpSpPr>
+      <p:grpSpPr>
+        <a:xfrm>
+          <a:off x="0" y="0"/>
+          <a:ext cx="0" cy="0"/>
+          <a:chOff x="0" y="0"/>
+          <a:chExt cx="0" cy="0"/>
+        </a:xfrm>
+      </p:grpSpPr>
+      <p:sp>
+        <p:nvSpPr>
+          <p:cNvPr id="2" name="Slide Image Placeholder 1"/>
+          <p:cNvSpPr>
+            <a:spLocks noGrp="1" noRot="1" noChangeAspect="1"/>
+          </p:cNvSpPr>
+          <p:nvPr>
+            <p:ph type="sldImg"/>
+          </p:nvPr>
+        </p:nvSpPr>
+        <p:spPr/>
+      </p:sp>
+      <p:sp>
+        <p:nvSpPr>
+          <p:cNvPr id="3" name="Notes Placeholder 2"/>
+          <p:cNvSpPr>
+            <a:spLocks noGrp="1"/>
+          </p:cNvSpPr>
+          <p:nvPr>
+            <p:ph type="body" idx="1"/>
+          </p:nvPr>
+        </p:nvSpPr>
+        <p:spPr/>
+        <p:txBody>
+          <a:bodyPr>
+            <a:normAutofit/>
+          </a:bodyPr>
+          <a:lstStyle/>
+          <a:p>
+            <a:r>
+              <a:rPr lang="en-US" dirty="0" smtClean="0"/>
+              <a:t>Problem:</a:t>
+            </a:r>
+            <a:r>
+              <a:rPr lang="en-US" baseline="0" dirty="0" smtClean="0"/>
+              <a:t> really hard to visualize, especially through diagrams on a whiteboard or other </a:t>
+            </a:r>
+            <a:r>
+              <a:rPr lang="en-US" baseline="0" smtClean="0"/>
+              <a:t>Euclidean surface</a:t>
+            </a:r>
+            <a:endParaRPr lang="en-US"/>
+          </a:p>
+        </p:txBody>
+      </p:sp>
+      <p:sp>
+        <p:nvSpPr>
+          <p:cNvPr id="4" name="Slide Number Placeholder 3"/>
+          <p:cNvSpPr>
+            <a:spLocks noGrp="1"/>
+          </p:cNvSpPr>
+          <p:nvPr>
+            <p:ph type="sldNum" sz="quarter" idx="10"/>
+          </p:nvPr>
+        </p:nvSpPr>
+        <p:spPr/>
+        <p:txBody>
+          <a:bodyPr/>
+          <a:lstStyle/>
+          <a:p>
+            <a:fld id="{64A8B611-7969-4ED8-BAA6-733A94B518BB}" type="slidenum">
+              <a:rPr lang="en-US" smtClean="0"/>
+              <a:t>4</a:t>
             </a:fld>
             <a:endParaRPr lang="en-US"/>
           </a:p>
@@ -4634,11 +4727,7 @@
             </a:r>
             <a:r>
               <a:rPr lang="en-US" dirty="0" smtClean="0"/>
-              <a:t>lying on a circle that meets the unit </a:t>
-            </a:r>
-            <a:r>
-              <a:rPr lang="en-US" smtClean="0"/>
-              <a:t>circle orthogonally</a:t>
+              <a:t>lying on a circle that meets the unit circle orthogonally</a:t>
             </a:r>
             <a:endParaRPr lang="en-US" dirty="0"/>
           </a:p>
@@ -4658,7 +4747,7 @@
         </p:xfrm>
         <a:graphic>
           <a:graphicData uri="http://schemas.openxmlformats.org/presentationml/2006/ole">
-            <p:oleObj spid="_x0000_s1026" name="Equation" r:id="rId3" imgW="672840" imgH="203040" progId="Equation.3">
+            <p:oleObj spid="_x0000_s1026" name="Equation" r:id="rId4" imgW="672840" imgH="203040" progId="Equation.3">
               <p:embed/>
             </p:oleObj>
           </a:graphicData>

</xml_diff>

<commit_message>
gaussian curvature, started "problem" slide
</commit_message>
<xml_diff>
--- a/hplanes.pptx
+++ b/hplanes.pptx
@@ -5,14 +5,13 @@
     <p:sldMasterId id="2147483660" r:id="rId1"/>
   </p:sldMasterIdLst>
   <p:notesMasterIdLst>
-    <p:notesMasterId r:id="rId7"/>
+    <p:notesMasterId r:id="rId6"/>
   </p:notesMasterIdLst>
   <p:sldIdLst>
     <p:sldId id="256" r:id="rId2"/>
     <p:sldId id="258" r:id="rId3"/>
-    <p:sldId id="257" r:id="rId4"/>
-    <p:sldId id="259" r:id="rId5"/>
-    <p:sldId id="260" r:id="rId6"/>
+    <p:sldId id="259" r:id="rId4"/>
+    <p:sldId id="260" r:id="rId5"/>
   </p:sldIdLst>
   <p:sldSz cx="9144000" cy="6858000" type="screen4x3"/>
   <p:notesSz cx="6858000" cy="9144000"/>
@@ -614,13 +613,124 @@
           <a:p>
             <a:r>
               <a:rPr lang="en-US" dirty="0" smtClean="0"/>
-              <a:t>Problem:</a:t>
+              <a:t>Hyperbolic plane: a Riemannian manifold with constant negative Gaussian</a:t>
             </a:r>
             <a:r>
               <a:rPr lang="en-US" baseline="0" dirty="0" smtClean="0"/>
-              <a:t> really hard to visualize, especially through diagrams on a whiteboard or other Euclidean surface</a:t>
+              <a:t> curvature</a:t>
+            </a:r>
+          </a:p>
+          <a:p>
+            <a:r>
+              <a:rPr lang="en-US" baseline="0" dirty="0" smtClean="0"/>
+              <a:t>C^2 embedding: surface is differentiably embedded into 3-space by an isometry whose first and second derivatives are continuous</a:t>
+            </a:r>
+          </a:p>
+          <a:p>
+            <a:r>
+              <a:rPr lang="en-US" baseline="0" dirty="0" smtClean="0"/>
+              <a:t>Circles = constant positive curvature, 1/R</a:t>
+            </a:r>
+          </a:p>
+          <a:p>
+            <a:r>
+              <a:rPr lang="en-US" baseline="0" dirty="0" smtClean="0"/>
+              <a:t>R = radius of the hyperbolic plane</a:t>
             </a:r>
             <a:endParaRPr lang="en-US" dirty="0"/>
+          </a:p>
+        </p:txBody>
+      </p:sp>
+      <p:sp>
+        <p:nvSpPr>
+          <p:cNvPr id="4" name="Slide Number Placeholder 3"/>
+          <p:cNvSpPr>
+            <a:spLocks noGrp="1"/>
+          </p:cNvSpPr>
+          <p:nvPr>
+            <p:ph type="sldNum" sz="quarter" idx="10"/>
+          </p:nvPr>
+        </p:nvSpPr>
+        <p:spPr/>
+        <p:txBody>
+          <a:bodyPr/>
+          <a:lstStyle/>
+          <a:p>
+            <a:fld id="{64A8B611-7969-4ED8-BAA6-733A94B518BB}" type="slidenum">
+              <a:rPr lang="en-US" smtClean="0"/>
+              <a:t>3</a:t>
+            </a:fld>
+            <a:endParaRPr lang="en-US"/>
+          </a:p>
+        </p:txBody>
+      </p:sp>
+    </p:spTree>
+  </p:cSld>
+  <p:clrMapOvr>
+    <a:masterClrMapping/>
+  </p:clrMapOvr>
+</p:notes>
+</file>
+
+<file path=ppt/notesSlides/notesSlide3.xml><?xml version="1.0" encoding="utf-8"?>
+<p:notes xmlns:a="http://schemas.openxmlformats.org/drawingml/2006/main" xmlns:r="http://schemas.openxmlformats.org/officeDocument/2006/relationships" xmlns:p="http://schemas.openxmlformats.org/presentationml/2006/main">
+  <p:cSld>
+    <p:spTree>
+      <p:nvGrpSpPr>
+        <p:cNvPr id="1" name=""/>
+        <p:cNvGrpSpPr/>
+        <p:nvPr/>
+      </p:nvGrpSpPr>
+      <p:grpSpPr>
+        <a:xfrm>
+          <a:off x="0" y="0"/>
+          <a:ext cx="0" cy="0"/>
+          <a:chOff x="0" y="0"/>
+          <a:chExt cx="0" cy="0"/>
+        </a:xfrm>
+      </p:grpSpPr>
+      <p:sp>
+        <p:nvSpPr>
+          <p:cNvPr id="2" name="Slide Image Placeholder 1"/>
+          <p:cNvSpPr>
+            <a:spLocks noGrp="1" noRot="1" noChangeAspect="1"/>
+          </p:cNvSpPr>
+          <p:nvPr>
+            <p:ph type="sldImg"/>
+          </p:nvPr>
+        </p:nvSpPr>
+        <p:spPr/>
+      </p:sp>
+      <p:sp>
+        <p:nvSpPr>
+          <p:cNvPr id="3" name="Notes Placeholder 2"/>
+          <p:cNvSpPr>
+            <a:spLocks noGrp="1"/>
+          </p:cNvSpPr>
+          <p:nvPr>
+            <p:ph type="body" idx="1"/>
+          </p:nvPr>
+        </p:nvSpPr>
+        <p:spPr/>
+        <p:txBody>
+          <a:bodyPr>
+            <a:normAutofit/>
+          </a:bodyPr>
+          <a:lstStyle/>
+          <a:p>
+            <a:r>
+              <a:rPr lang="en-US" dirty="0" smtClean="0"/>
+              <a:t>Spherical</a:t>
+            </a:r>
+            <a:r>
+              <a:rPr lang="en-US" baseline="0" dirty="0" smtClean="0"/>
+              <a:t> geometry: use the surface of </a:t>
+            </a:r>
+            <a:r>
+              <a:rPr lang="en-US" baseline="0" smtClean="0"/>
+              <a:t>a ball</a:t>
+            </a:r>
+            <a:endParaRPr lang="en-US"/>
           </a:p>
         </p:txBody>
       </p:sp>
@@ -4565,7 +4675,7 @@
           <a:p>
             <a:r>
               <a:rPr lang="en-US" dirty="0" smtClean="0"/>
-              <a:t>What is a hyperbolic plane?</a:t>
+              <a:t>Gaussian curvature</a:t>
             </a:r>
             <a:endParaRPr lang="en-US" dirty="0"/>
           </a:p>
@@ -4589,27 +4699,64 @@
           <a:lstStyle/>
           <a:p>
             <a:r>
-              <a:rPr lang="en-US" sz="3600" dirty="0" smtClean="0"/>
-              <a:t>D</a:t>
-            </a:r>
-            <a:r>
-              <a:rPr lang="en-US" sz="3600" dirty="0" smtClean="0"/>
-              <a:t>escribed by the </a:t>
-            </a:r>
-            <a:r>
-              <a:rPr lang="en-US" sz="3600" dirty="0" err="1" smtClean="0"/>
-              <a:t>Poincaré</a:t>
-            </a:r>
-            <a:r>
-              <a:rPr lang="en-US" sz="3600" dirty="0" smtClean="0"/>
-              <a:t> disc model</a:t>
-            </a:r>
-          </a:p>
-          <a:p>
-            <a:r>
-              <a:rPr lang="en-US" sz="3600" dirty="0" smtClean="0"/>
-              <a:t>Alternatively, a simply connected complete Riemannian manifold with constant negative Gaussian curvature</a:t>
-            </a:r>
+              <a:rPr lang="en-US" sz="2800" i="1" dirty="0" err="1" smtClean="0"/>
+              <a:t>Theorema</a:t>
+            </a:r>
+            <a:r>
+              <a:rPr lang="en-US" sz="2800" i="1" dirty="0" smtClean="0"/>
+              <a:t> </a:t>
+            </a:r>
+            <a:r>
+              <a:rPr lang="en-US" sz="2800" i="1" dirty="0" err="1" smtClean="0"/>
+              <a:t>Egregium</a:t>
+            </a:r>
+            <a:r>
+              <a:rPr lang="en-US" sz="2800" dirty="0" smtClean="0"/>
+              <a:t>: Gaussian curvature is an intrinsic property, independent of C</a:t>
+            </a:r>
+            <a:r>
+              <a:rPr lang="en-US" sz="2800" baseline="30000" dirty="0" smtClean="0"/>
+              <a:t>2</a:t>
+            </a:r>
+            <a:r>
+              <a:rPr lang="en-US" sz="2800" dirty="0" smtClean="0"/>
+              <a:t> embedding</a:t>
+            </a:r>
+          </a:p>
+          <a:p>
+            <a:r>
+              <a:rPr lang="en-US" sz="2800" dirty="0" smtClean="0"/>
+              <a:t>Spheres have constant positive curvature: (1/R</a:t>
+            </a:r>
+            <a:r>
+              <a:rPr lang="en-US" sz="2800" baseline="30000" dirty="0" smtClean="0"/>
+              <a:t>2</a:t>
+            </a:r>
+            <a:r>
+              <a:rPr lang="en-US" sz="2800" dirty="0" smtClean="0"/>
+              <a:t>)</a:t>
+            </a:r>
+          </a:p>
+          <a:p>
+            <a:r>
+              <a:rPr lang="en-US" sz="2800" dirty="0" smtClean="0"/>
+              <a:t>Planes have zero curvature</a:t>
+            </a:r>
+          </a:p>
+          <a:p>
+            <a:r>
+              <a:rPr lang="en-US" sz="2800" dirty="0" smtClean="0"/>
+              <a:t>Hyperbolic planes have constant negative curvature: (-1/R</a:t>
+            </a:r>
+            <a:r>
+              <a:rPr lang="en-US" sz="2800" baseline="30000" dirty="0" smtClean="0"/>
+              <a:t>2</a:t>
+            </a:r>
+            <a:r>
+              <a:rPr lang="en-US" sz="2800" dirty="0" smtClean="0"/>
+              <a:t>)</a:t>
+            </a:r>
+            <a:endParaRPr lang="en-US" sz="2800" dirty="0"/>
           </a:p>
         </p:txBody>
       </p:sp>
@@ -4654,12 +4801,8 @@
           <a:lstStyle/>
           <a:p>
             <a:r>
-              <a:rPr lang="en-US" sz="5400" dirty="0" err="1" smtClean="0"/>
-              <a:t>Poincaré</a:t>
-            </a:r>
-            <a:r>
-              <a:rPr lang="en-US" sz="5400" dirty="0" smtClean="0"/>
-              <a:t> disc model</a:t>
+              <a:rPr lang="en-US" dirty="0" smtClean="0"/>
+              <a:t>Problem</a:t>
             </a:r>
             <a:endParaRPr lang="en-US" dirty="0"/>
           </a:p>
@@ -4680,152 +4823,12 @@
           <a:bodyPr/>
           <a:lstStyle/>
           <a:p>
+            <a:pPr>
+              <a:buNone/>
+            </a:pPr>
             <a:r>
               <a:rPr lang="en-US" dirty="0" smtClean="0"/>
-              <a:t>All points within the unit circle </a:t>
-            </a:r>
-            <a:r>
-              <a:rPr lang="el-GR" dirty="0" smtClean="0"/>
-              <a:t>Ω</a:t>
-            </a:r>
-            <a:r>
-              <a:rPr lang="en-US" dirty="0" smtClean="0"/>
-              <a:t> with the center at the origin</a:t>
-            </a:r>
-          </a:p>
-          <a:p>
-            <a:r>
-              <a:rPr lang="en-US" dirty="0" smtClean="0"/>
-              <a:t>Point: an ordered pair (</a:t>
-            </a:r>
-            <a:r>
-              <a:rPr lang="en-US" i="1" dirty="0" err="1" smtClean="0"/>
-              <a:t>a,b</a:t>
-            </a:r>
-            <a:r>
-              <a:rPr lang="en-US" dirty="0" smtClean="0"/>
-              <a:t>) of real numbers satisfying</a:t>
-            </a:r>
-          </a:p>
-          <a:p>
-            <a:endParaRPr lang="en-US" dirty="0" smtClean="0"/>
-          </a:p>
-          <a:p>
-            <a:endParaRPr lang="en-US" dirty="0" smtClean="0"/>
-          </a:p>
-          <a:p>
-            <a:r>
-              <a:rPr lang="en-US" dirty="0" smtClean="0"/>
-              <a:t>Line: points inside </a:t>
-            </a:r>
-            <a:r>
-              <a:rPr lang="el-GR" dirty="0" smtClean="0"/>
-              <a:t>Ω </a:t>
-            </a:r>
-            <a:r>
-              <a:rPr lang="en-US" dirty="0" smtClean="0"/>
-              <a:t>lying on a circle that meets the unit circle orthogonally</a:t>
-            </a:r>
-            <a:endParaRPr lang="en-US" dirty="0"/>
-          </a:p>
-        </p:txBody>
-      </p:sp>
-      <p:graphicFrame>
-        <p:nvGraphicFramePr>
-          <p:cNvPr id="4" name="Object 3"/>
-          <p:cNvGraphicFramePr>
-            <a:graphicFrameLocks noChangeAspect="1"/>
-          </p:cNvGraphicFramePr>
-          <p:nvPr/>
-        </p:nvGraphicFramePr>
-        <p:xfrm>
-          <a:off x="3124200" y="3429000"/>
-          <a:ext cx="2103438" cy="635000"/>
-        </p:xfrm>
-        <a:graphic>
-          <a:graphicData uri="http://schemas.openxmlformats.org/presentationml/2006/ole">
-            <p:oleObj spid="_x0000_s1026" name="Equation" r:id="rId4" imgW="672840" imgH="203040" progId="Equation.3">
-              <p:embed/>
-            </p:oleObj>
-          </a:graphicData>
-        </a:graphic>
-      </p:graphicFrame>
-    </p:spTree>
-  </p:cSld>
-  <p:clrMapOvr>
-    <a:masterClrMapping/>
-  </p:clrMapOvr>
-</p:sld>
-</file>
-
-<file path=ppt/slides/slide5.xml><?xml version="1.0" encoding="utf-8"?>
-<p:sld xmlns:a="http://schemas.openxmlformats.org/drawingml/2006/main" xmlns:r="http://schemas.openxmlformats.org/officeDocument/2006/relationships" xmlns:p="http://schemas.openxmlformats.org/presentationml/2006/main">
-  <p:cSld>
-    <p:spTree>
-      <p:nvGrpSpPr>
-        <p:cNvPr id="1" name=""/>
-        <p:cNvGrpSpPr/>
-        <p:nvPr/>
-      </p:nvGrpSpPr>
-      <p:grpSpPr>
-        <a:xfrm>
-          <a:off x="0" y="0"/>
-          <a:ext cx="0" cy="0"/>
-          <a:chOff x="0" y="0"/>
-          <a:chExt cx="0" cy="0"/>
-        </a:xfrm>
-      </p:grpSpPr>
-      <p:sp>
-        <p:nvSpPr>
-          <p:cNvPr id="2" name="Title 1"/>
-          <p:cNvSpPr>
-            <a:spLocks noGrp="1"/>
-          </p:cNvSpPr>
-          <p:nvPr>
-            <p:ph type="title"/>
-          </p:nvPr>
-        </p:nvSpPr>
-        <p:spPr/>
-        <p:txBody>
-          <a:bodyPr/>
-          <a:lstStyle/>
-          <a:p>
-            <a:r>
-              <a:rPr lang="en-US" dirty="0" smtClean="0"/>
-              <a:t>Riemannian manifolds</a:t>
-            </a:r>
-            <a:endParaRPr lang="en-US" dirty="0"/>
-          </a:p>
-        </p:txBody>
-      </p:sp>
-      <p:sp>
-        <p:nvSpPr>
-          <p:cNvPr id="3" name="Content Placeholder 2"/>
-          <p:cNvSpPr>
-            <a:spLocks noGrp="1"/>
-          </p:cNvSpPr>
-          <p:nvPr>
-            <p:ph idx="1"/>
-          </p:nvPr>
-        </p:nvSpPr>
-        <p:spPr/>
-        <p:txBody>
-          <a:bodyPr/>
-          <a:lstStyle/>
-          <a:p>
-            <a:r>
-              <a:rPr lang="en-US" dirty="0" smtClean="0"/>
-              <a:t>A surface differentiably embedded in 3-space by an isometry whose first and second derivatives are continuous</a:t>
-            </a:r>
-          </a:p>
-          <a:p>
-            <a:r>
-              <a:rPr lang="en-US" dirty="0" smtClean="0"/>
-              <a:t>Geometry is approximately Euclidean on a </a:t>
-            </a:r>
-            <a:r>
-              <a:rPr lang="en-US" smtClean="0"/>
-              <a:t>small scale</a:t>
+              <a:t>Studying hyperbolic geometry is easier with a physical model.</a:t>
             </a:r>
             <a:endParaRPr lang="en-US" dirty="0"/>
           </a:p>

</xml_diff>

<commit_message>
added photo of paper plane
</commit_message>
<xml_diff>
--- a/hplanes.pptx
+++ b/hplanes.pptx
@@ -5,13 +5,15 @@
     <p:sldMasterId id="2147483660" r:id="rId1"/>
   </p:sldMasterIdLst>
   <p:notesMasterIdLst>
-    <p:notesMasterId r:id="rId6"/>
+    <p:notesMasterId r:id="rId8"/>
   </p:notesMasterIdLst>
   <p:sldIdLst>
     <p:sldId id="256" r:id="rId2"/>
     <p:sldId id="258" r:id="rId3"/>
     <p:sldId id="259" r:id="rId4"/>
     <p:sldId id="260" r:id="rId5"/>
+    <p:sldId id="261" r:id="rId6"/>
+    <p:sldId id="262" r:id="rId7"/>
   </p:sldIdLst>
   <p:sldSz cx="9144000" cy="6858000" type="screen4x3"/>
   <p:notesSz cx="6858000" cy="9144000"/>
@@ -775,6 +777,97 @@
             <a:fld id="{64A8B611-7969-4ED8-BAA6-733A94B518BB}" type="slidenum">
               <a:rPr lang="en-US" smtClean="0"/>
               <a:t>4</a:t>
+            </a:fld>
+            <a:endParaRPr lang="en-US"/>
+          </a:p>
+        </p:txBody>
+      </p:sp>
+    </p:spTree>
+  </p:cSld>
+  <p:clrMapOvr>
+    <a:masterClrMapping/>
+  </p:clrMapOvr>
+</p:notes>
+</file>
+
+<file path=ppt/notesSlides/notesSlide4.xml><?xml version="1.0" encoding="utf-8"?>
+<p:notes xmlns:a="http://schemas.openxmlformats.org/drawingml/2006/main" xmlns:r="http://schemas.openxmlformats.org/officeDocument/2006/relationships" xmlns:p="http://schemas.openxmlformats.org/presentationml/2006/main">
+  <p:cSld>
+    <p:spTree>
+      <p:nvGrpSpPr>
+        <p:cNvPr id="1" name=""/>
+        <p:cNvGrpSpPr/>
+        <p:nvPr/>
+      </p:nvGrpSpPr>
+      <p:grpSpPr>
+        <a:xfrm>
+          <a:off x="0" y="0"/>
+          <a:ext cx="0" cy="0"/>
+          <a:chOff x="0" y="0"/>
+          <a:chExt cx="0" cy="0"/>
+        </a:xfrm>
+      </p:grpSpPr>
+      <p:sp>
+        <p:nvSpPr>
+          <p:cNvPr id="2" name="Slide Image Placeholder 1"/>
+          <p:cNvSpPr>
+            <a:spLocks noGrp="1" noRot="1" noChangeAspect="1"/>
+          </p:cNvSpPr>
+          <p:nvPr>
+            <p:ph type="sldImg"/>
+          </p:nvPr>
+        </p:nvSpPr>
+        <p:spPr/>
+      </p:sp>
+      <p:sp>
+        <p:nvSpPr>
+          <p:cNvPr id="3" name="Notes Placeholder 2"/>
+          <p:cNvSpPr>
+            <a:spLocks noGrp="1"/>
+          </p:cNvSpPr>
+          <p:nvPr>
+            <p:ph type="body" idx="1"/>
+          </p:nvPr>
+        </p:nvSpPr>
+        <p:spPr/>
+        <p:txBody>
+          <a:bodyPr>
+            <a:normAutofit/>
+          </a:bodyPr>
+          <a:lstStyle/>
+          <a:p>
+            <a:r>
+              <a:rPr lang="en-US" dirty="0" smtClean="0"/>
+              <a:t>Paper-and-tape model, developed by William Thurston</a:t>
+            </a:r>
+          </a:p>
+          <a:p>
+            <a:r>
+              <a:rPr lang="en-US" dirty="0" smtClean="0"/>
+              <a:t>Very fragile</a:t>
+            </a:r>
+            <a:endParaRPr lang="en-US" dirty="0"/>
+          </a:p>
+        </p:txBody>
+      </p:sp>
+      <p:sp>
+        <p:nvSpPr>
+          <p:cNvPr id="4" name="Slide Number Placeholder 3"/>
+          <p:cNvSpPr>
+            <a:spLocks noGrp="1"/>
+          </p:cNvSpPr>
+          <p:nvPr>
+            <p:ph type="sldNum" sz="quarter" idx="10"/>
+          </p:nvPr>
+        </p:nvSpPr>
+        <p:spPr/>
+        <p:txBody>
+          <a:bodyPr/>
+          <a:lstStyle/>
+          <a:p>
+            <a:fld id="{64A8B611-7969-4ED8-BAA6-733A94B518BB}" type="slidenum">
+              <a:rPr lang="en-US" smtClean="0"/>
+              <a:t>5</a:t>
             </a:fld>
             <a:endParaRPr lang="en-US"/>
           </a:p>
@@ -4862,16 +4955,145 @@
           <a:p>
             <a:r>
               <a:rPr lang="en-US" dirty="0" smtClean="0"/>
-              <a:t>A physical surface is much easier </a:t>
-            </a:r>
-            <a:r>
-              <a:rPr lang="en-US" smtClean="0"/>
-              <a:t>to study</a:t>
-            </a:r>
-            <a:endParaRPr lang="en-US" dirty="0" smtClean="0"/>
+              <a:t>A physical surface is much easier to study</a:t>
+            </a:r>
           </a:p>
           <a:p>
             <a:endParaRPr lang="en-US" dirty="0"/>
+          </a:p>
+        </p:txBody>
+      </p:sp>
+    </p:spTree>
+  </p:cSld>
+  <p:clrMapOvr>
+    <a:masterClrMapping/>
+  </p:clrMapOvr>
+</p:sld>
+</file>
+
+<file path=ppt/slides/slide5.xml><?xml version="1.0" encoding="utf-8"?>
+<p:sld xmlns:a="http://schemas.openxmlformats.org/drawingml/2006/main" xmlns:r="http://schemas.openxmlformats.org/officeDocument/2006/relationships" xmlns:p="http://schemas.openxmlformats.org/presentationml/2006/main">
+  <p:cSld>
+    <p:spTree>
+      <p:nvGrpSpPr>
+        <p:cNvPr id="1" name=""/>
+        <p:cNvGrpSpPr/>
+        <p:nvPr/>
+      </p:nvGrpSpPr>
+      <p:grpSpPr>
+        <a:xfrm>
+          <a:off x="0" y="0"/>
+          <a:ext cx="0" cy="0"/>
+          <a:chOff x="0" y="0"/>
+          <a:chExt cx="0" cy="0"/>
+        </a:xfrm>
+      </p:grpSpPr>
+      <p:sp>
+        <p:nvSpPr>
+          <p:cNvPr id="2" name="Title 1"/>
+          <p:cNvSpPr>
+            <a:spLocks noGrp="1"/>
+          </p:cNvSpPr>
+          <p:nvPr>
+            <p:ph type="title"/>
+          </p:nvPr>
+        </p:nvSpPr>
+        <p:spPr/>
+        <p:txBody>
+          <a:bodyPr/>
+          <a:lstStyle/>
+          <a:p>
+            <a:r>
+              <a:rPr lang="en-US" dirty="0" smtClean="0"/>
+              <a:t>Initial solution</a:t>
+            </a:r>
+            <a:endParaRPr lang="en-US" dirty="0"/>
+          </a:p>
+        </p:txBody>
+      </p:sp>
+      <p:pic>
+        <p:nvPicPr>
+          <p:cNvPr id="4" name="Content Placeholder 3" descr="paper-plane.jpg"/>
+          <p:cNvPicPr>
+            <a:picLocks noGrp="1" noChangeAspect="1"/>
+          </p:cNvPicPr>
+          <p:nvPr>
+            <p:ph idx="1"/>
+          </p:nvPr>
+        </p:nvPicPr>
+        <p:blipFill>
+          <a:blip r:embed="rId3" cstate="print"/>
+          <a:stretch>
+            <a:fillRect/>
+          </a:stretch>
+        </p:blipFill>
+        <p:spPr>
+          <a:xfrm>
+            <a:off x="1828800" y="1828800"/>
+            <a:ext cx="5562600" cy="4127860"/>
+          </a:xfrm>
+        </p:spPr>
+      </p:pic>
+    </p:spTree>
+  </p:cSld>
+  <p:clrMapOvr>
+    <a:masterClrMapping/>
+  </p:clrMapOvr>
+</p:sld>
+</file>
+
+<file path=ppt/slides/slide6.xml><?xml version="1.0" encoding="utf-8"?>
+<p:sld xmlns:a="http://schemas.openxmlformats.org/drawingml/2006/main" xmlns:r="http://schemas.openxmlformats.org/officeDocument/2006/relationships" xmlns:p="http://schemas.openxmlformats.org/presentationml/2006/main">
+  <p:cSld>
+    <p:spTree>
+      <p:nvGrpSpPr>
+        <p:cNvPr id="1" name=""/>
+        <p:cNvGrpSpPr/>
+        <p:nvPr/>
+      </p:nvGrpSpPr>
+      <p:grpSpPr>
+        <a:xfrm>
+          <a:off x="0" y="0"/>
+          <a:ext cx="0" cy="0"/>
+          <a:chOff x="0" y="0"/>
+          <a:chExt cx="0" cy="0"/>
+        </a:xfrm>
+      </p:grpSpPr>
+      <p:sp>
+        <p:nvSpPr>
+          <p:cNvPr id="2" name="Title 1"/>
+          <p:cNvSpPr>
+            <a:spLocks noGrp="1"/>
+          </p:cNvSpPr>
+          <p:nvPr>
+            <p:ph type="title"/>
+          </p:nvPr>
+        </p:nvSpPr>
+        <p:spPr/>
+        <p:txBody>
+          <a:bodyPr/>
+          <a:lstStyle/>
+          <a:p>
+            <a:endParaRPr lang="en-US" dirty="0"/>
+          </a:p>
+        </p:txBody>
+      </p:sp>
+      <p:sp>
+        <p:nvSpPr>
+          <p:cNvPr id="3" name="Content Placeholder 2"/>
+          <p:cNvSpPr>
+            <a:spLocks noGrp="1"/>
+          </p:cNvSpPr>
+          <p:nvPr>
+            <p:ph idx="1"/>
+          </p:nvPr>
+        </p:nvSpPr>
+        <p:spPr/>
+        <p:txBody>
+          <a:bodyPr/>
+          <a:lstStyle/>
+          <a:p>
+            <a:endParaRPr lang="en-US"/>
           </a:p>
         </p:txBody>
       </p:sp>

</xml_diff>

<commit_message>
examples of daina's planes
</commit_message>
<xml_diff>
--- a/hplanes.pptx
+++ b/hplanes.pptx
@@ -5,7 +5,7 @@
     <p:sldMasterId id="2147483660" r:id="rId1"/>
   </p:sldMasterIdLst>
   <p:notesMasterIdLst>
-    <p:notesMasterId r:id="rId10"/>
+    <p:notesMasterId r:id="rId12"/>
   </p:notesMasterIdLst>
   <p:sldIdLst>
     <p:sldId id="256" r:id="rId2"/>
@@ -16,6 +16,8 @@
     <p:sldId id="262" r:id="rId7"/>
     <p:sldId id="263" r:id="rId8"/>
     <p:sldId id="264" r:id="rId9"/>
+    <p:sldId id="265" r:id="rId10"/>
+    <p:sldId id="266" r:id="rId11"/>
   </p:sldIdLst>
   <p:sldSz cx="9144000" cy="6858000" type="screen4x3"/>
   <p:notesSz cx="6858000" cy="9144000"/>
@@ -1055,11 +1057,7 @@
           <a:p>
             <a:r>
               <a:rPr lang="en-US" dirty="0" smtClean="0"/>
-              <a:t>Exponential growth: length </a:t>
-            </a:r>
-            <a:r>
-              <a:rPr lang="en-US" smtClean="0"/>
-              <a:t>of row/round</a:t>
+              <a:t>Exponential growth: length of row/round</a:t>
             </a:r>
             <a:endParaRPr lang="en-US" dirty="0"/>
           </a:p>
@@ -1083,6 +1081,99 @@
             <a:fld id="{64A8B611-7969-4ED8-BAA6-733A94B518BB}" type="slidenum">
               <a:rPr lang="en-US" smtClean="0"/>
               <a:t>8</a:t>
+            </a:fld>
+            <a:endParaRPr lang="en-US"/>
+          </a:p>
+        </p:txBody>
+      </p:sp>
+    </p:spTree>
+  </p:cSld>
+  <p:clrMapOvr>
+    <a:masterClrMapping/>
+  </p:clrMapOvr>
+</p:notes>
+</file>
+
+<file path=ppt/notesSlides/notesSlide7.xml><?xml version="1.0" encoding="utf-8"?>
+<p:notes xmlns:a="http://schemas.openxmlformats.org/drawingml/2006/main" xmlns:r="http://schemas.openxmlformats.org/officeDocument/2006/relationships" xmlns:p="http://schemas.openxmlformats.org/presentationml/2006/main">
+  <p:cSld>
+    <p:spTree>
+      <p:nvGrpSpPr>
+        <p:cNvPr id="1" name=""/>
+        <p:cNvGrpSpPr/>
+        <p:nvPr/>
+      </p:nvGrpSpPr>
+      <p:grpSpPr>
+        <a:xfrm>
+          <a:off x="0" y="0"/>
+          <a:ext cx="0" cy="0"/>
+          <a:chOff x="0" y="0"/>
+          <a:chExt cx="0" cy="0"/>
+        </a:xfrm>
+      </p:grpSpPr>
+      <p:sp>
+        <p:nvSpPr>
+          <p:cNvPr id="2" name="Slide Image Placeholder 1"/>
+          <p:cNvSpPr>
+            <a:spLocks noGrp="1" noRot="1" noChangeAspect="1"/>
+          </p:cNvSpPr>
+          <p:nvPr>
+            <p:ph type="sldImg"/>
+          </p:nvPr>
+        </p:nvSpPr>
+        <p:spPr/>
+      </p:sp>
+      <p:sp>
+        <p:nvSpPr>
+          <p:cNvPr id="3" name="Notes Placeholder 2"/>
+          <p:cNvSpPr>
+            <a:spLocks noGrp="1"/>
+          </p:cNvSpPr>
+          <p:nvPr>
+            <p:ph type="body" idx="1"/>
+          </p:nvPr>
+        </p:nvSpPr>
+        <p:spPr/>
+        <p:txBody>
+          <a:bodyPr>
+            <a:normAutofit/>
+          </a:bodyPr>
+          <a:lstStyle/>
+          <a:p>
+            <a:r>
+              <a:rPr lang="en-US" dirty="0" err="1" smtClean="0"/>
+              <a:t>Daina</a:t>
+            </a:r>
+            <a:r>
+              <a:rPr lang="en-US" dirty="0" smtClean="0"/>
+              <a:t> </a:t>
+            </a:r>
+            <a:r>
+              <a:rPr lang="en-US" dirty="0" err="1" smtClean="0"/>
+              <a:t>Taimina</a:t>
+            </a:r>
+            <a:endParaRPr lang="en-US" dirty="0"/>
+          </a:p>
+        </p:txBody>
+      </p:sp>
+      <p:sp>
+        <p:nvSpPr>
+          <p:cNvPr id="4" name="Slide Number Placeholder 3"/>
+          <p:cNvSpPr>
+            <a:spLocks noGrp="1"/>
+          </p:cNvSpPr>
+          <p:nvPr>
+            <p:ph type="sldNum" sz="quarter" idx="10"/>
+          </p:nvPr>
+        </p:nvSpPr>
+        <p:spPr/>
+        <p:txBody>
+          <a:bodyPr/>
+          <a:lstStyle/>
+          <a:p>
+            <a:fld id="{64A8B611-7969-4ED8-BAA6-733A94B518BB}" type="slidenum">
+              <a:rPr lang="en-US" smtClean="0"/>
+              <a:t>9</a:t>
             </a:fld>
             <a:endParaRPr lang="en-US"/>
           </a:p>
@@ -4914,6 +5005,77 @@
 </p:sld>
 </file>
 
+<file path=ppt/slides/slide10.xml><?xml version="1.0" encoding="utf-8"?>
+<p:sld xmlns:a="http://schemas.openxmlformats.org/drawingml/2006/main" xmlns:r="http://schemas.openxmlformats.org/officeDocument/2006/relationships" xmlns:p="http://schemas.openxmlformats.org/presentationml/2006/main">
+  <p:cSld>
+    <p:spTree>
+      <p:nvGrpSpPr>
+        <p:cNvPr id="1" name=""/>
+        <p:cNvGrpSpPr/>
+        <p:nvPr/>
+      </p:nvGrpSpPr>
+      <p:grpSpPr>
+        <a:xfrm>
+          <a:off x="0" y="0"/>
+          <a:ext cx="0" cy="0"/>
+          <a:chOff x="0" y="0"/>
+          <a:chExt cx="0" cy="0"/>
+        </a:xfrm>
+      </p:grpSpPr>
+      <p:pic>
+        <p:nvPicPr>
+          <p:cNvPr id="5" name="Content Placeholder 4" descr="wool2.jpg"/>
+          <p:cNvPicPr>
+            <a:picLocks noGrp="1" noChangeAspect="1"/>
+          </p:cNvPicPr>
+          <p:nvPr>
+            <p:ph sz="half" idx="1"/>
+          </p:nvPr>
+        </p:nvPicPr>
+        <p:blipFill>
+          <a:blip r:embed="rId2" cstate="print"/>
+          <a:stretch>
+            <a:fillRect/>
+          </a:stretch>
+        </p:blipFill>
+        <p:spPr>
+          <a:xfrm>
+            <a:off x="457200" y="2463788"/>
+            <a:ext cx="4038600" cy="3348062"/>
+          </a:xfrm>
+        </p:spPr>
+      </p:pic>
+      <p:pic>
+        <p:nvPicPr>
+          <p:cNvPr id="6" name="Content Placeholder 5" descr="hp2.jpg"/>
+          <p:cNvPicPr>
+            <a:picLocks noGrp="1" noChangeAspect="1"/>
+          </p:cNvPicPr>
+          <p:nvPr>
+            <p:ph sz="half" idx="2"/>
+          </p:nvPr>
+        </p:nvPicPr>
+        <p:blipFill>
+          <a:blip r:embed="rId3" cstate="print"/>
+          <a:stretch>
+            <a:fillRect/>
+          </a:stretch>
+        </p:blipFill>
+        <p:spPr>
+          <a:xfrm>
+            <a:off x="4542744" y="2209800"/>
+            <a:ext cx="3862874" cy="3505200"/>
+          </a:xfrm>
+        </p:spPr>
+      </p:pic>
+    </p:spTree>
+  </p:cSld>
+  <p:clrMapOvr>
+    <a:masterClrMapping/>
+  </p:clrMapOvr>
+</p:sld>
+</file>
+
 <file path=ppt/slides/slide2.xml><?xml version="1.0" encoding="utf-8"?>
 <p:sld xmlns:a="http://schemas.openxmlformats.org/drawingml/2006/main" xmlns:r="http://schemas.openxmlformats.org/officeDocument/2006/relationships" xmlns:p="http://schemas.openxmlformats.org/presentationml/2006/main">
   <p:cSld>
@@ -5516,13 +5678,84 @@
           </a:p>
           <a:p>
             <a:r>
-              <a:rPr lang="en-US" smtClean="0"/>
+              <a:rPr lang="en-US" dirty="0" smtClean="0"/>
               <a:t>An approximation at best</a:t>
             </a:r>
             <a:endParaRPr lang="en-US" dirty="0"/>
           </a:p>
         </p:txBody>
       </p:sp>
+    </p:spTree>
+  </p:cSld>
+  <p:clrMapOvr>
+    <a:masterClrMapping/>
+  </p:clrMapOvr>
+</p:sld>
+</file>
+
+<file path=ppt/slides/slide9.xml><?xml version="1.0" encoding="utf-8"?>
+<p:sld xmlns:a="http://schemas.openxmlformats.org/drawingml/2006/main" xmlns:r="http://schemas.openxmlformats.org/officeDocument/2006/relationships" xmlns:p="http://schemas.openxmlformats.org/presentationml/2006/main">
+  <p:cSld>
+    <p:spTree>
+      <p:nvGrpSpPr>
+        <p:cNvPr id="1" name=""/>
+        <p:cNvGrpSpPr/>
+        <p:nvPr/>
+      </p:nvGrpSpPr>
+      <p:grpSpPr>
+        <a:xfrm>
+          <a:off x="0" y="0"/>
+          <a:ext cx="0" cy="0"/>
+          <a:chOff x="0" y="0"/>
+          <a:chExt cx="0" cy="0"/>
+        </a:xfrm>
+      </p:grpSpPr>
+      <p:pic>
+        <p:nvPicPr>
+          <p:cNvPr id="5" name="Content Placeholder 4" descr="4x100.jpg"/>
+          <p:cNvPicPr>
+            <a:picLocks noGrp="1" noChangeAspect="1"/>
+          </p:cNvPicPr>
+          <p:nvPr>
+            <p:ph sz="half" idx="1"/>
+          </p:nvPr>
+        </p:nvPicPr>
+        <p:blipFill>
+          <a:blip r:embed="rId3" cstate="print"/>
+          <a:stretch>
+            <a:fillRect/>
+          </a:stretch>
+        </p:blipFill>
+        <p:spPr>
+          <a:xfrm>
+            <a:off x="457200" y="2229580"/>
+            <a:ext cx="4038600" cy="3816477"/>
+          </a:xfrm>
+        </p:spPr>
+      </p:pic>
+      <p:pic>
+        <p:nvPicPr>
+          <p:cNvPr id="6" name="Content Placeholder 5" descr="orange.jpg"/>
+          <p:cNvPicPr>
+            <a:picLocks noGrp="1" noChangeAspect="1"/>
+          </p:cNvPicPr>
+          <p:nvPr>
+            <p:ph sz="half" idx="2"/>
+          </p:nvPr>
+        </p:nvPicPr>
+        <p:blipFill>
+          <a:blip r:embed="rId4" cstate="print"/>
+          <a:stretch>
+            <a:fillRect/>
+          </a:stretch>
+        </p:blipFill>
+        <p:spPr>
+          <a:xfrm>
+            <a:off x="4648200" y="2319690"/>
+            <a:ext cx="4038600" cy="3636258"/>
+          </a:xfrm>
+        </p:spPr>
+      </p:pic>
     </p:spTree>
   </p:cSld>
   <p:clrMapOvr>

</xml_diff>

<commit_message>
radius stuff, started triangle slide
</commit_message>
<xml_diff>
--- a/hplanes.pptx
+++ b/hplanes.pptx
@@ -5,7 +5,7 @@
     <p:sldMasterId id="2147483660" r:id="rId1"/>
   </p:sldMasterIdLst>
   <p:notesMasterIdLst>
-    <p:notesMasterId r:id="rId12"/>
+    <p:notesMasterId r:id="rId13"/>
   </p:notesMasterIdLst>
   <p:sldIdLst>
     <p:sldId id="256" r:id="rId2"/>
@@ -18,6 +18,7 @@
     <p:sldId id="264" r:id="rId9"/>
     <p:sldId id="265" r:id="rId10"/>
     <p:sldId id="266" r:id="rId11"/>
+    <p:sldId id="267" r:id="rId12"/>
   </p:sldIdLst>
   <p:sldSz cx="9144000" cy="6858000" type="screen4x3"/>
   <p:notesSz cx="6858000" cy="9144000"/>
@@ -641,7 +642,11 @@
           <a:p>
             <a:r>
               <a:rPr lang="en-US" baseline="0" dirty="0" smtClean="0"/>
-              <a:t>R = radius of the hyperbolic plane</a:t>
+              <a:t>R = radius of the hyperbolic plane = radius </a:t>
+            </a:r>
+            <a:r>
+              <a:rPr lang="en-US" baseline="0" smtClean="0"/>
+              <a:t>of annuli</a:t>
             </a:r>
             <a:endParaRPr lang="en-US" dirty="0"/>
           </a:p>
@@ -1263,7 +1268,7 @@
               <a:t>pseudosphere</a:t>
             </a:r>
             <a:r>
-              <a:rPr lang="en-US" baseline="0" smtClean="0"/>
+              <a:rPr lang="en-US" baseline="0" dirty="0" smtClean="0"/>
               <a:t> with 11:12 ratio</a:t>
             </a:r>
             <a:endParaRPr lang="en-US" dirty="0"/>
@@ -5179,6 +5184,96 @@
           <a:xfrm>
             <a:off x="4542744" y="2209800"/>
             <a:ext cx="3862874" cy="3505200"/>
+          </a:xfrm>
+        </p:spPr>
+      </p:pic>
+    </p:spTree>
+  </p:cSld>
+  <p:clrMapOvr>
+    <a:masterClrMapping/>
+  </p:clrMapOvr>
+</p:sld>
+</file>
+
+<file path=ppt/slides/slide11.xml><?xml version="1.0" encoding="utf-8"?>
+<p:sld xmlns:a="http://schemas.openxmlformats.org/drawingml/2006/main" xmlns:r="http://schemas.openxmlformats.org/officeDocument/2006/relationships" xmlns:p="http://schemas.openxmlformats.org/presentationml/2006/main">
+  <p:cSld>
+    <p:spTree>
+      <p:nvGrpSpPr>
+        <p:cNvPr id="1" name=""/>
+        <p:cNvGrpSpPr/>
+        <p:nvPr/>
+      </p:nvGrpSpPr>
+      <p:grpSpPr>
+        <a:xfrm>
+          <a:off x="0" y="0"/>
+          <a:ext cx="0" cy="0"/>
+          <a:chOff x="0" y="0"/>
+          <a:chExt cx="0" cy="0"/>
+        </a:xfrm>
+      </p:grpSpPr>
+      <p:sp>
+        <p:nvSpPr>
+          <p:cNvPr id="2" name="Title 1"/>
+          <p:cNvSpPr>
+            <a:spLocks noGrp="1"/>
+          </p:cNvSpPr>
+          <p:nvPr>
+            <p:ph type="title"/>
+          </p:nvPr>
+        </p:nvSpPr>
+        <p:spPr/>
+        <p:txBody>
+          <a:bodyPr/>
+          <a:lstStyle/>
+          <a:p>
+            <a:r>
+              <a:rPr lang="en-US" dirty="0" smtClean="0"/>
+              <a:t>Hyperbolic Triangles</a:t>
+            </a:r>
+            <a:endParaRPr lang="en-US" dirty="0"/>
+          </a:p>
+        </p:txBody>
+      </p:sp>
+      <p:sp>
+        <p:nvSpPr>
+          <p:cNvPr id="3" name="Content Placeholder 2"/>
+          <p:cNvSpPr>
+            <a:spLocks noGrp="1"/>
+          </p:cNvSpPr>
+          <p:nvPr>
+            <p:ph sz="half" idx="1"/>
+          </p:nvPr>
+        </p:nvSpPr>
+        <p:spPr/>
+        <p:txBody>
+          <a:bodyPr/>
+          <a:lstStyle/>
+          <a:p>
+            <a:endParaRPr lang="en-US"/>
+          </a:p>
+        </p:txBody>
+      </p:sp>
+      <p:pic>
+        <p:nvPicPr>
+          <p:cNvPr id="5" name="Content Placeholder 4" descr="htriangle.eps"/>
+          <p:cNvPicPr>
+            <a:picLocks noGrp="1" noChangeAspect="1"/>
+          </p:cNvPicPr>
+          <p:nvPr>
+            <p:ph sz="half" idx="2"/>
+          </p:nvPr>
+        </p:nvPicPr>
+        <p:blipFill>
+          <a:blip r:embed="rId2" cstate="print"/>
+          <a:stretch>
+            <a:fillRect/>
+          </a:stretch>
+        </p:blipFill>
+        <p:spPr>
+          <a:xfrm>
+            <a:off x="4648200" y="1988320"/>
+            <a:ext cx="4038600" cy="4298997"/>
           </a:xfrm>
         </p:spPr>
       </p:pic>

</xml_diff>